<commit_message>
Update UE19CS204 – WT – Quiz Website.pptx
</commit_message>
<xml_diff>
--- a/UE19CS204 – WT – Quiz Website.pptx
+++ b/UE19CS204 – WT – Quiz Website.pptx
@@ -307,7 +307,7 @@
           <a:p>
             <a:fld id="{37B0890D-01E6-49DF-A341-A670F1E2DAD4}" type="datetimeFigureOut">
               <a:rPr lang="en-US" smtClean="0"/>
-              <a:t>12/6/2020</a:t>
+              <a:t>12/8/2020</a:t>
             </a:fld>
             <a:endParaRPr lang="en-GB"/>
           </a:p>
@@ -472,7 +472,7 @@
           <a:p>
             <a:fld id="{37B0890D-01E6-49DF-A341-A670F1E2DAD4}" type="datetimeFigureOut">
               <a:rPr lang="en-US" smtClean="0"/>
-              <a:t>12/6/2020</a:t>
+              <a:t>12/8/2020</a:t>
             </a:fld>
             <a:endParaRPr lang="en-GB"/>
           </a:p>
@@ -647,7 +647,7 @@
           <a:p>
             <a:fld id="{37B0890D-01E6-49DF-A341-A670F1E2DAD4}" type="datetimeFigureOut">
               <a:rPr lang="en-US" smtClean="0"/>
-              <a:t>12/6/2020</a:t>
+              <a:t>12/8/2020</a:t>
             </a:fld>
             <a:endParaRPr lang="en-GB"/>
           </a:p>
@@ -812,7 +812,7 @@
           <a:p>
             <a:fld id="{37B0890D-01E6-49DF-A341-A670F1E2DAD4}" type="datetimeFigureOut">
               <a:rPr lang="en-US" smtClean="0"/>
-              <a:t>12/6/2020</a:t>
+              <a:t>12/8/2020</a:t>
             </a:fld>
             <a:endParaRPr lang="en-GB"/>
           </a:p>
@@ -1053,7 +1053,7 @@
           <a:p>
             <a:fld id="{37B0890D-01E6-49DF-A341-A670F1E2DAD4}" type="datetimeFigureOut">
               <a:rPr lang="en-US" smtClean="0"/>
-              <a:t>12/6/2020</a:t>
+              <a:t>12/8/2020</a:t>
             </a:fld>
             <a:endParaRPr lang="en-GB"/>
           </a:p>
@@ -1336,7 +1336,7 @@
           <a:p>
             <a:fld id="{37B0890D-01E6-49DF-A341-A670F1E2DAD4}" type="datetimeFigureOut">
               <a:rPr lang="en-US" smtClean="0"/>
-              <a:t>12/6/2020</a:t>
+              <a:t>12/8/2020</a:t>
             </a:fld>
             <a:endParaRPr lang="en-GB"/>
           </a:p>
@@ -1753,7 +1753,7 @@
           <a:p>
             <a:fld id="{37B0890D-01E6-49DF-A341-A670F1E2DAD4}" type="datetimeFigureOut">
               <a:rPr lang="en-US" smtClean="0"/>
-              <a:t>12/6/2020</a:t>
+              <a:t>12/8/2020</a:t>
             </a:fld>
             <a:endParaRPr lang="en-GB"/>
           </a:p>
@@ -1866,7 +1866,7 @@
           <a:p>
             <a:fld id="{37B0890D-01E6-49DF-A341-A670F1E2DAD4}" type="datetimeFigureOut">
               <a:rPr lang="en-US" smtClean="0"/>
-              <a:t>12/6/2020</a:t>
+              <a:t>12/8/2020</a:t>
             </a:fld>
             <a:endParaRPr lang="en-GB"/>
           </a:p>
@@ -1956,7 +1956,7 @@
           <a:p>
             <a:fld id="{37B0890D-01E6-49DF-A341-A670F1E2DAD4}" type="datetimeFigureOut">
               <a:rPr lang="en-US" smtClean="0"/>
-              <a:t>12/6/2020</a:t>
+              <a:t>12/8/2020</a:t>
             </a:fld>
             <a:endParaRPr lang="en-GB"/>
           </a:p>
@@ -2228,7 +2228,7 @@
           <a:p>
             <a:fld id="{37B0890D-01E6-49DF-A341-A670F1E2DAD4}" type="datetimeFigureOut">
               <a:rPr lang="en-US" smtClean="0"/>
-              <a:t>12/6/2020</a:t>
+              <a:t>12/8/2020</a:t>
             </a:fld>
             <a:endParaRPr lang="en-GB"/>
           </a:p>
@@ -2476,7 +2476,7 @@
           <a:p>
             <a:fld id="{37B0890D-01E6-49DF-A341-A670F1E2DAD4}" type="datetimeFigureOut">
               <a:rPr lang="en-US" smtClean="0"/>
-              <a:t>12/6/2020</a:t>
+              <a:t>12/8/2020</a:t>
             </a:fld>
             <a:endParaRPr lang="en-GB"/>
           </a:p>
@@ -2684,7 +2684,7 @@
           <a:p>
             <a:fld id="{37B0890D-01E6-49DF-A341-A670F1E2DAD4}" type="datetimeFigureOut">
               <a:rPr lang="en-US" smtClean="0"/>
-              <a:t>12/6/2020</a:t>
+              <a:t>12/8/2020</a:t>
             </a:fld>
             <a:endParaRPr lang="en-GB"/>
           </a:p>
@@ -3214,7 +3214,7 @@
         </p:spPr>
         <p:txBody>
           <a:bodyPr vert="horz" lIns="91440" tIns="45720" rIns="91440" bIns="45720" rtlCol="0">
-            <a:normAutofit/>
+            <a:normAutofit fontScale="77500" lnSpcReduction="20000"/>
           </a:bodyPr>
           <a:lstStyle/>
           <a:p>
@@ -3252,7 +3252,7 @@
                 <a:ea typeface="+mn-ea"/>
                 <a:cs typeface="+mn-cs"/>
               </a:rPr>
-              <a:t>GITHUB Link - </a:t>
+              <a:t>GITHUB Link - https://github.com/Skanda-hue/WebTech </a:t>
             </a:r>
             <a:endParaRPr kumimoji="0" lang="en-GB" sz="2800" b="0" i="0" u="none" strike="noStrike" kern="1200" cap="none" spc="0" normalizeH="0" baseline="0" noProof="0" dirty="0">
               <a:ln>
@@ -3505,9 +3505,16 @@
             <p:ph idx="1"/>
           </p:nvPr>
         </p:nvSpPr>
-        <p:spPr/>
-        <p:txBody>
-          <a:bodyPr/>
+        <p:spPr>
+          <a:xfrm>
+            <a:off x="457200" y="1219200"/>
+            <a:ext cx="8229600" cy="5364162"/>
+          </a:xfrm>
+        </p:spPr>
+        <p:txBody>
+          <a:bodyPr>
+            <a:normAutofit fontScale="92500" lnSpcReduction="20000"/>
+          </a:bodyPr>
           <a:lstStyle/>
           <a:p>
             <a:r>
@@ -3546,6 +3553,62 @@
               <a:rPr lang="en-US" dirty="0" err="1"/>
               <a:t>npm</a:t>
             </a:r>
+            <a:endParaRPr lang="en-US" dirty="0"/>
+          </a:p>
+          <a:p>
+            <a:r>
+              <a:rPr lang="en-US" dirty="0"/>
+              <a:t>React-router-</a:t>
+            </a:r>
+            <a:r>
+              <a:rPr lang="en-US" dirty="0" err="1"/>
+              <a:t>dom</a:t>
+            </a:r>
+            <a:r>
+              <a:rPr lang="en-US" dirty="0"/>
+              <a:t>(for link)</a:t>
+            </a:r>
+          </a:p>
+          <a:p>
+            <a:r>
+              <a:rPr lang="en-US" dirty="0" err="1"/>
+              <a:t>Axios</a:t>
+            </a:r>
+            <a:endParaRPr lang="en-US" dirty="0"/>
+          </a:p>
+          <a:p>
+            <a:r>
+              <a:rPr lang="en-US" dirty="0" err="1"/>
+              <a:t>Bcryptjs</a:t>
+            </a:r>
+            <a:endParaRPr lang="en-US" dirty="0"/>
+          </a:p>
+          <a:p>
+            <a:r>
+              <a:rPr lang="en-US" dirty="0"/>
+              <a:t>Express</a:t>
+            </a:r>
+          </a:p>
+          <a:p>
+            <a:r>
+              <a:rPr lang="en-US" dirty="0"/>
+              <a:t>Mongoose</a:t>
+            </a:r>
+          </a:p>
+          <a:p>
+            <a:r>
+              <a:rPr lang="en-US" dirty="0" err="1"/>
+              <a:t>Jsonwebtoken</a:t>
+            </a:r>
+            <a:endParaRPr lang="en-US" dirty="0"/>
+          </a:p>
+          <a:p>
+            <a:endParaRPr lang="en-US" dirty="0"/>
+          </a:p>
+          <a:p>
+            <a:endParaRPr lang="en-US" dirty="0"/>
+          </a:p>
+          <a:p>
             <a:endParaRPr lang="en-US" dirty="0"/>
           </a:p>
           <a:p>

</xml_diff>